<commit_message>
renamed products to programs and various namespace changes to make it consistent with ezloyalty.
</commit_message>
<xml_diff>
--- a/Solution Architecture Presentation.pptx
+++ b/Solution Architecture Presentation.pptx
@@ -605,7 +605,7 @@
           <a:p>
             <a:fld id="{72345051-2045-45DA-935E-2E3CA1A69ADC}" type="datetimeFigureOut">
               <a:rPr lang="en-US" smtClean="0"/>
-              <a:t>2/26/2022</a:t>
+              <a:t>2/27/2022</a:t>
             </a:fld>
             <a:endParaRPr lang="en-US" dirty="0"/>
           </a:p>
@@ -804,7 +804,7 @@
           <a:p>
             <a:fld id="{72345051-2045-45DA-935E-2E3CA1A69ADC}" type="datetimeFigureOut">
               <a:rPr lang="en-US" smtClean="0"/>
-              <a:t>2/26/2022</a:t>
+              <a:t>2/27/2022</a:t>
             </a:fld>
             <a:endParaRPr lang="en-US"/>
           </a:p>
@@ -1013,7 +1013,7 @@
           <a:p>
             <a:fld id="{72345051-2045-45DA-935E-2E3CA1A69ADC}" type="datetimeFigureOut">
               <a:rPr lang="en-US" smtClean="0"/>
-              <a:t>2/26/2022</a:t>
+              <a:t>2/27/2022</a:t>
             </a:fld>
             <a:endParaRPr lang="en-US"/>
           </a:p>
@@ -1236,7 +1236,7 @@
           <a:p>
             <a:fld id="{72345051-2045-45DA-935E-2E3CA1A69ADC}" type="datetimeFigureOut">
               <a:rPr lang="en-US" smtClean="0"/>
-              <a:t>2/26/2022</a:t>
+              <a:t>2/27/2022</a:t>
             </a:fld>
             <a:endParaRPr lang="en-US"/>
           </a:p>
@@ -2147,7 +2147,7 @@
           <a:p>
             <a:fld id="{72345051-2045-45DA-935E-2E3CA1A69ADC}" type="datetimeFigureOut">
               <a:rPr lang="en-US" smtClean="0"/>
-              <a:t>2/26/2022</a:t>
+              <a:t>2/27/2022</a:t>
             </a:fld>
             <a:endParaRPr lang="en-US"/>
           </a:p>
@@ -2751,7 +2751,7 @@
           <a:p>
             <a:fld id="{72345051-2045-45DA-935E-2E3CA1A69ADC}" type="datetimeFigureOut">
               <a:rPr lang="en-US" smtClean="0"/>
-              <a:t>2/26/2022</a:t>
+              <a:t>2/27/2022</a:t>
             </a:fld>
             <a:endParaRPr lang="en-US"/>
           </a:p>
@@ -3800,7 +3800,7 @@
           <a:p>
             <a:fld id="{72345051-2045-45DA-935E-2E3CA1A69ADC}" type="datetimeFigureOut">
               <a:rPr lang="en-US" smtClean="0"/>
-              <a:t>2/26/2022</a:t>
+              <a:t>2/27/2022</a:t>
             </a:fld>
             <a:endParaRPr lang="en-US"/>
           </a:p>
@@ -4584,7 +4584,7 @@
           <a:p>
             <a:fld id="{72345051-2045-45DA-935E-2E3CA1A69ADC}" type="datetimeFigureOut">
               <a:rPr lang="en-US" smtClean="0"/>
-              <a:t>2/26/2022</a:t>
+              <a:t>2/27/2022</a:t>
             </a:fld>
             <a:endParaRPr lang="en-US"/>
           </a:p>
@@ -5033,7 +5033,7 @@
           <a:p>
             <a:fld id="{72345051-2045-45DA-935E-2E3CA1A69ADC}" type="datetimeFigureOut">
               <a:rPr lang="en-US" smtClean="0"/>
-              <a:t>2/26/2022</a:t>
+              <a:t>2/27/2022</a:t>
             </a:fld>
             <a:endParaRPr lang="en-US"/>
           </a:p>
@@ -5350,7 +5350,7 @@
           <a:p>
             <a:fld id="{72345051-2045-45DA-935E-2E3CA1A69ADC}" type="datetimeFigureOut">
               <a:rPr lang="en-US" smtClean="0"/>
-              <a:t>2/26/2022</a:t>
+              <a:t>2/27/2022</a:t>
             </a:fld>
             <a:endParaRPr lang="en-US"/>
           </a:p>
@@ -5978,7 +5978,7 @@
           <a:p>
             <a:fld id="{72345051-2045-45DA-935E-2E3CA1A69ADC}" type="datetimeFigureOut">
               <a:rPr lang="en-US" smtClean="0"/>
-              <a:t>2/26/2022</a:t>
+              <a:t>2/27/2022</a:t>
             </a:fld>
             <a:endParaRPr lang="en-US"/>
           </a:p>
@@ -6553,7 +6553,7 @@
           <a:p>
             <a:fld id="{72345051-2045-45DA-935E-2E3CA1A69ADC}" type="datetimeFigureOut">
               <a:rPr lang="en-US" smtClean="0"/>
-              <a:t>2/26/2022</a:t>
+              <a:t>2/27/2022</a:t>
             </a:fld>
             <a:endParaRPr lang="en-US" dirty="0"/>
           </a:p>
@@ -9202,7 +9202,7 @@
         </p:nvSpPr>
         <p:spPr>
           <a:xfrm>
-            <a:off x="863601" y="1972734"/>
+            <a:off x="871172" y="1488830"/>
             <a:ext cx="3378200" cy="2099734"/>
           </a:xfrm>
           <a:prstGeom prst="rect">
@@ -9243,7 +9243,7 @@
                 </a:solidFill>
                 <a:latin typeface="Kristen ITC" panose="03050502040202030202" pitchFamily="66" charset="0"/>
               </a:rPr>
-              <a:t>Account</a:t>
+              <a:t>Accounts</a:t>
             </a:r>
           </a:p>
         </p:txBody>
@@ -9262,7 +9262,7 @@
         </p:nvSpPr>
         <p:spPr>
           <a:xfrm>
-            <a:off x="1799168" y="2620432"/>
+            <a:off x="1806739" y="2136528"/>
             <a:ext cx="1507066" cy="808568"/>
           </a:xfrm>
           <a:prstGeom prst="ellipse">
@@ -9605,7 +9605,7 @@
                 </a:solidFill>
                 <a:latin typeface="Kristen ITC" panose="03050502040202030202" pitchFamily="66" charset="0"/>
               </a:rPr>
-              <a:t>Program</a:t>
+              <a:t>Programs</a:t>
             </a:r>
           </a:p>
         </p:txBody>
@@ -9686,8 +9686,8 @@
         </p:nvSpPr>
         <p:spPr>
           <a:xfrm>
-            <a:off x="4978401" y="609599"/>
-            <a:ext cx="3378200" cy="2455333"/>
+            <a:off x="5010475" y="74571"/>
+            <a:ext cx="5618447" cy="2455333"/>
           </a:xfrm>
           <a:prstGeom prst="rect">
             <a:avLst/>
@@ -9727,7 +9727,7 @@
                 </a:solidFill>
                 <a:latin typeface="Kristen ITC" panose="03050502040202030202" pitchFamily="66" charset="0"/>
               </a:rPr>
-              <a:t>Action</a:t>
+              <a:t>Actions</a:t>
             </a:r>
           </a:p>
         </p:txBody>
@@ -9746,7 +9746,7 @@
         </p:nvSpPr>
         <p:spPr>
           <a:xfrm>
-            <a:off x="5101168" y="1164166"/>
+            <a:off x="5198534" y="468268"/>
             <a:ext cx="1507066" cy="808568"/>
           </a:xfrm>
           <a:prstGeom prst="ellipse">
@@ -9777,7 +9777,7 @@
           <a:p>
             <a:pPr algn="ctr"/>
             <a:r>
-              <a:rPr lang="en-US" sz="800" dirty="0" err="1">
+              <a:rPr lang="en-US" sz="800" dirty="0">
                 <a:solidFill>
                   <a:schemeClr val="tx1"/>
                 </a:solidFill>
@@ -9785,12 +9785,6 @@
               </a:rPr>
               <a:t>ActionMetadata</a:t>
             </a:r>
-            <a:endParaRPr lang="en-US" sz="800" dirty="0">
-              <a:solidFill>
-                <a:schemeClr val="tx1"/>
-              </a:solidFill>
-              <a:latin typeface="Kristen ITC" panose="03050502040202030202" pitchFamily="66" charset="0"/>
-            </a:endParaRPr>
           </a:p>
         </p:txBody>
       </p:sp>
@@ -9808,7 +9802,7 @@
         </p:nvSpPr>
         <p:spPr>
           <a:xfrm>
-            <a:off x="6728884" y="1151468"/>
+            <a:off x="6977836" y="451013"/>
             <a:ext cx="1507066" cy="808568"/>
           </a:xfrm>
           <a:prstGeom prst="ellipse">
@@ -9839,7 +9833,7 @@
           <a:p>
             <a:pPr algn="ctr"/>
             <a:r>
-              <a:rPr lang="en-US" sz="800" dirty="0" err="1">
+              <a:rPr lang="en-US" sz="800" dirty="0">
                 <a:solidFill>
                   <a:schemeClr val="tx1"/>
                 </a:solidFill>
@@ -9847,12 +9841,6 @@
               </a:rPr>
               <a:t>ActionStatus</a:t>
             </a:r>
-            <a:endParaRPr lang="en-US" sz="800" dirty="0">
-              <a:solidFill>
-                <a:schemeClr val="tx1"/>
-              </a:solidFill>
-              <a:latin typeface="Kristen ITC" panose="03050502040202030202" pitchFamily="66" charset="0"/>
-            </a:endParaRPr>
           </a:p>
         </p:txBody>
       </p:sp>
@@ -9870,7 +9858,7 @@
         </p:nvSpPr>
         <p:spPr>
           <a:xfrm>
-            <a:off x="5913968" y="2123017"/>
+            <a:off x="6112935" y="1521550"/>
             <a:ext cx="1507066" cy="808568"/>
           </a:xfrm>
           <a:prstGeom prst="ellipse">
@@ -9922,6 +9910,7 @@
             </a:extLst>
           </p:cNvPr>
           <p:cNvCxnSpPr>
+            <a:cxnSpLocks/>
             <a:stCxn id="3" idx="3"/>
             <a:endCxn id="11" idx="1"/>
           </p:cNvCxnSpPr>
@@ -9929,8 +9918,8 @@
         </p:nvCxnSpPr>
         <p:spPr>
           <a:xfrm flipV="1">
-            <a:off x="4241801" y="1837266"/>
-            <a:ext cx="736600" cy="1185335"/>
+            <a:off x="4249372" y="1302238"/>
+            <a:ext cx="761103" cy="1236459"/>
           </a:xfrm>
           <a:prstGeom prst="straightConnector1">
             <a:avLst/>
@@ -9971,8 +9960,8 @@
         </p:nvCxnSpPr>
         <p:spPr>
           <a:xfrm>
-            <a:off x="4241801" y="3022601"/>
-            <a:ext cx="2129366" cy="1253066"/>
+            <a:off x="4249372" y="2538697"/>
+            <a:ext cx="2121795" cy="1736970"/>
           </a:xfrm>
           <a:prstGeom prst="straightConnector1">
             <a:avLst/>
@@ -10052,8 +10041,8 @@
         </p:nvSpPr>
         <p:spPr>
           <a:xfrm>
-            <a:off x="8636001" y="2700868"/>
-            <a:ext cx="3378200" cy="1651000"/>
+            <a:off x="8803379" y="3429000"/>
+            <a:ext cx="2035908" cy="1651000"/>
           </a:xfrm>
           <a:prstGeom prst="rect">
             <a:avLst/>
@@ -10093,7 +10082,7 @@
                 </a:solidFill>
                 <a:latin typeface="Kristen ITC" panose="03050502040202030202" pitchFamily="66" charset="0"/>
               </a:rPr>
-              <a:t>Incentive</a:t>
+              <a:t>Incentives</a:t>
             </a:r>
           </a:p>
         </p:txBody>
@@ -10112,7 +10101,7 @@
         </p:nvSpPr>
         <p:spPr>
           <a:xfrm>
-            <a:off x="9571568" y="3160186"/>
+            <a:off x="9082456" y="4000824"/>
             <a:ext cx="1507066" cy="808568"/>
           </a:xfrm>
           <a:prstGeom prst="ellipse">
@@ -10165,15 +10154,15 @@
           </p:cNvPr>
           <p:cNvCxnSpPr>
             <a:cxnSpLocks/>
-            <a:stCxn id="11" idx="3"/>
+            <a:stCxn id="11" idx="2"/>
             <a:endCxn id="21" idx="0"/>
           </p:cNvCxnSpPr>
           <p:nvPr/>
         </p:nvCxnSpPr>
         <p:spPr>
           <a:xfrm>
-            <a:off x="8356601" y="1837266"/>
-            <a:ext cx="1968500" cy="863602"/>
+            <a:off x="7819699" y="2529904"/>
+            <a:ext cx="2001634" cy="899096"/>
           </a:xfrm>
           <a:prstGeom prst="straightConnector1">
             <a:avLst/>
@@ -10215,8 +10204,8 @@
         </p:nvCxnSpPr>
         <p:spPr>
           <a:xfrm>
-            <a:off x="4241801" y="3022601"/>
-            <a:ext cx="4394200" cy="503767"/>
+            <a:off x="4249372" y="2538697"/>
+            <a:ext cx="4554007" cy="1715803"/>
           </a:xfrm>
           <a:prstGeom prst="straightConnector1">
             <a:avLst/>
@@ -10240,6 +10229,136 @@
           </a:fontRef>
         </p:style>
       </p:cxnSp>
+      <p:sp>
+        <p:nvSpPr>
+          <p:cNvPr id="51" name="Oval 50">
+            <a:extLst>
+              <a:ext uri="{FF2B5EF4-FFF2-40B4-BE49-F238E27FC236}">
+                <a16:creationId xmlns:a16="http://schemas.microsoft.com/office/drawing/2014/main" id="{266665B9-DC56-48F7-929F-5501EB142A31}"/>
+              </a:ext>
+            </a:extLst>
+          </p:cNvPr>
+          <p:cNvSpPr/>
+          <p:nvPr/>
+        </p:nvSpPr>
+        <p:spPr>
+          <a:xfrm>
+            <a:off x="8803379" y="451013"/>
+            <a:ext cx="1507066" cy="808568"/>
+          </a:xfrm>
+          <a:prstGeom prst="ellipse">
+            <a:avLst/>
+          </a:prstGeom>
+          <a:noFill/>
+          <a:ln w="50800">
+            <a:solidFill>
+              <a:schemeClr val="bg1">
+                <a:lumMod val="50000"/>
+              </a:schemeClr>
+            </a:solidFill>
+          </a:ln>
+        </p:spPr>
+        <p:style>
+          <a:lnRef idx="2">
+            <a:schemeClr val="accent2">
+              <a:shade val="50000"/>
+            </a:schemeClr>
+          </a:lnRef>
+          <a:fillRef idx="1">
+            <a:schemeClr val="accent2"/>
+          </a:fillRef>
+          <a:effectRef idx="0">
+            <a:schemeClr val="accent2"/>
+          </a:effectRef>
+          <a:fontRef idx="minor">
+            <a:schemeClr val="lt1"/>
+          </a:fontRef>
+        </p:style>
+        <p:txBody>
+          <a:bodyPr rtlCol="0" anchor="ctr"/>
+          <a:lstStyle/>
+          <a:p>
+            <a:pPr algn="ctr"/>
+            <a:r>
+              <a:rPr lang="en-US" sz="800" dirty="0">
+                <a:solidFill>
+                  <a:schemeClr val="tx1"/>
+                </a:solidFill>
+                <a:latin typeface="Kristen ITC" panose="03050502040202030202" pitchFamily="66" charset="0"/>
+              </a:rPr>
+              <a:t>Rules</a:t>
+            </a:r>
+          </a:p>
+        </p:txBody>
+      </p:sp>
+      <p:sp>
+        <p:nvSpPr>
+          <p:cNvPr id="52" name="Oval 51">
+            <a:extLst>
+              <a:ext uri="{FF2B5EF4-FFF2-40B4-BE49-F238E27FC236}">
+                <a16:creationId xmlns:a16="http://schemas.microsoft.com/office/drawing/2014/main" id="{9B0F6BDD-87AC-4144-A862-C06AF8B4A6C9}"/>
+              </a:ext>
+            </a:extLst>
+          </p:cNvPr>
+          <p:cNvSpPr/>
+          <p:nvPr/>
+        </p:nvSpPr>
+        <p:spPr>
+          <a:xfrm>
+            <a:off x="7968928" y="1515366"/>
+            <a:ext cx="1507066" cy="808568"/>
+          </a:xfrm>
+          <a:prstGeom prst="ellipse">
+            <a:avLst/>
+          </a:prstGeom>
+          <a:noFill/>
+          <a:ln w="50800">
+            <a:solidFill>
+              <a:schemeClr val="bg1">
+                <a:lumMod val="50000"/>
+              </a:schemeClr>
+            </a:solidFill>
+          </a:ln>
+        </p:spPr>
+        <p:style>
+          <a:lnRef idx="2">
+            <a:schemeClr val="accent2">
+              <a:shade val="50000"/>
+            </a:schemeClr>
+          </a:lnRef>
+          <a:fillRef idx="1">
+            <a:schemeClr val="accent2"/>
+          </a:fillRef>
+          <a:effectRef idx="0">
+            <a:schemeClr val="accent2"/>
+          </a:effectRef>
+          <a:fontRef idx="minor">
+            <a:schemeClr val="lt1"/>
+          </a:fontRef>
+        </p:style>
+        <p:txBody>
+          <a:bodyPr rtlCol="0" anchor="ctr"/>
+          <a:lstStyle/>
+          <a:p>
+            <a:pPr algn="ctr"/>
+            <a:r>
+              <a:rPr lang="en-US" sz="800" dirty="0" err="1">
+                <a:solidFill>
+                  <a:schemeClr val="tx1"/>
+                </a:solidFill>
+                <a:latin typeface="Kristen ITC" panose="03050502040202030202" pitchFamily="66" charset="0"/>
+              </a:rPr>
+              <a:t>ActionRules</a:t>
+            </a:r>
+            <a:endParaRPr lang="en-US" sz="800" dirty="0">
+              <a:solidFill>
+                <a:schemeClr val="tx1"/>
+              </a:solidFill>
+              <a:latin typeface="Kristen ITC" panose="03050502040202030202" pitchFamily="66" charset="0"/>
+            </a:endParaRPr>
+          </a:p>
+        </p:txBody>
+      </p:sp>
     </p:spTree>
     <p:extLst>
       <p:ext uri="{BB962C8B-B14F-4D97-AF65-F5344CB8AC3E}">

</xml_diff>